<commit_message>
corrected date inthe slides
</commit_message>
<xml_diff>
--- a/slides/ais2022_lect2.pptx
+++ b/slides/ais2022_lect2.pptx
@@ -101,7 +101,7 @@
         <p:txBody>
           <a:bodyPr/>
           <a:p>
-            <a:fld id="{4A4F80C0-3974-43E5-A28F-AF714EB8D3E2}" type="slidenum">
+            <a:fld id="{4D4DF8C6-1257-4F96-A143-08DE01A27654}" type="slidenum">
               <a:t>&lt;#&gt;</a:t>
             </a:fld>
           </a:p>
@@ -289,7 +289,7 @@
         <p:txBody>
           <a:bodyPr/>
           <a:p>
-            <a:fld id="{62F93673-6A38-4D65-A56F-1A4312BCD1EC}" type="slidenum">
+            <a:fld id="{BB63F374-9AB7-43ED-9DD8-A1EA2A200BA6}" type="slidenum">
               <a:t>&lt;#&gt;</a:t>
             </a:fld>
           </a:p>
@@ -545,7 +545,7 @@
         <p:txBody>
           <a:bodyPr/>
           <a:p>
-            <a:fld id="{75434264-3FC2-4BA9-9DFE-3748EC8E9D71}" type="slidenum">
+            <a:fld id="{72495A93-34B7-47AD-9800-47D43EFE39B8}" type="slidenum">
               <a:t>&lt;#&gt;</a:t>
             </a:fld>
           </a:p>
@@ -869,7 +869,7 @@
         <p:txBody>
           <a:bodyPr/>
           <a:p>
-            <a:fld id="{BDBB5184-B380-4152-AF94-26BC3B9262E0}" type="slidenum">
+            <a:fld id="{6F2F7FAA-7222-4A41-BC54-D157A1B1B034}" type="slidenum">
               <a:t>&lt;#&gt;</a:t>
             </a:fld>
           </a:p>
@@ -1643,7 +1643,7 @@
         <p:txBody>
           <a:bodyPr/>
           <a:p>
-            <a:fld id="{320EAF9C-BCDD-4D18-A704-59634930287F}" type="slidenum">
+            <a:fld id="{CF81768A-BE98-4D47-87D6-A91B06491EFE}" type="slidenum">
               <a:t>&lt;#&gt;</a:t>
             </a:fld>
           </a:p>
@@ -2704,7 +2704,7 @@
         <p:txBody>
           <a:bodyPr/>
           <a:p>
-            <a:fld id="{CAD5BAAA-81AE-42FB-A6F6-C2F780FCEB61}" type="slidenum">
+            <a:fld id="{E5CB2B05-4DB6-4483-A896-65D305FE43F1}" type="slidenum">
               <a:t>&lt;#&gt;</a:t>
             </a:fld>
           </a:p>
@@ -2892,7 +2892,7 @@
         <p:txBody>
           <a:bodyPr/>
           <a:p>
-            <a:fld id="{949D478C-5EFC-4237-8559-EF4D0055C71C}" type="slidenum">
+            <a:fld id="{28763C0E-E2C8-4B80-A344-6057CBC9A1A6}" type="slidenum">
               <a:t>&lt;#&gt;</a:t>
             </a:fld>
           </a:p>
@@ -3012,7 +3012,7 @@
         <p:txBody>
           <a:bodyPr/>
           <a:p>
-            <a:fld id="{99DF3685-BD7A-4663-B4F7-FB87AF9F4394}" type="slidenum">
+            <a:fld id="{D744FC67-DE4F-47FF-892C-6B7FFDD8BD0E}" type="slidenum">
               <a:t>&lt;#&gt;</a:t>
             </a:fld>
           </a:p>
@@ -3132,7 +3132,7 @@
         <p:txBody>
           <a:bodyPr/>
           <a:p>
-            <a:fld id="{0A6EAECC-0C33-4EFE-9777-CC5A53875AB4}" type="slidenum">
+            <a:fld id="{B8C588F4-EC2E-4A90-826A-C4C7E4D24F55}" type="slidenum">
               <a:t>&lt;#&gt;</a:t>
             </a:fld>
           </a:p>
@@ -3354,7 +3354,7 @@
         <p:txBody>
           <a:bodyPr/>
           <a:p>
-            <a:fld id="{3105110F-0B33-4AC9-A8D9-4DF52B880367}" type="slidenum">
+            <a:fld id="{0804EC76-2E72-449D-AC2A-E257BC6950BF}" type="slidenum">
               <a:t>&lt;#&gt;</a:t>
             </a:fld>
           </a:p>
@@ -3576,7 +3576,7 @@
         <p:txBody>
           <a:bodyPr/>
           <a:p>
-            <a:fld id="{22A15FDF-EC40-4C74-9949-B2A5AA280E3D}" type="slidenum">
+            <a:fld id="{E9D2DD42-A613-49B4-BC31-057E8C90495B}" type="slidenum">
               <a:t>&lt;#&gt;</a:t>
             </a:fld>
           </a:p>
@@ -3798,7 +3798,7 @@
         <p:txBody>
           <a:bodyPr/>
           <a:p>
-            <a:fld id="{A041CC4C-7446-43BF-8240-51A4F8AA0A4E}" type="slidenum">
+            <a:fld id="{84DDF28D-B5D9-4820-B585-E77DED8032D7}" type="slidenum">
               <a:t>&lt;#&gt;</a:t>
             </a:fld>
           </a:p>
@@ -4210,7 +4210,7 @@
             <a:pPr algn="r">
               <a:buNone/>
             </a:pPr>
-            <a:fld id="{5FB30262-D2DE-4FE8-BDC1-1C6ED16FFDC7}" type="slidenum">
+            <a:fld id="{29515442-64C4-48AE-AD37-F60C767902A4}" type="slidenum">
               <a:rPr b="0" lang="en-US" sz="1400" spc="-1" strike="noStrike">
                 <a:latin typeface="Times New Roman"/>
               </a:rPr>
@@ -4758,7 +4758,7 @@
         <p:txBody>
           <a:bodyPr/>
           <a:p>
-            <a:fld id="{1FF7B463-525A-48B6-AC98-27566F426E9E}" type="slidenum">
+            <a:fld id="{CF55D0D6-96F2-4EBB-9883-F400809BBA12}" type="slidenum">
               <a:t>1</a:t>
             </a:fld>
           </a:p>
@@ -4780,7 +4780,7 @@
           <a:p>
             <a:r>
               <a:rPr lang="en-US"/>
-              <a:t>10. Oct. 2018</a:t>
+              <a:t>27.May 2022</a:t>
             </a:r>
           </a:p>
         </p:txBody>
@@ -4982,7 +4982,7 @@
         <p:txBody>
           <a:bodyPr/>
           <a:p>
-            <a:fld id="{76A0161F-9C4C-4203-B7B5-2BEA32AC18C2}" type="slidenum">
+            <a:fld id="{A186E43F-F43C-4C0A-AD76-00F343151D14}" type="slidenum">
               <a:t>10</a:t>
             </a:fld>
           </a:p>
@@ -5004,7 +5004,7 @@
           <a:p>
             <a:r>
               <a:rPr lang="en-US"/>
-              <a:t>10. Oct. 2018</a:t>
+              <a:t>27.May 2022</a:t>
             </a:r>
           </a:p>
         </p:txBody>
@@ -5188,7 +5188,7 @@
         <p:txBody>
           <a:bodyPr/>
           <a:p>
-            <a:fld id="{DAA67FED-FF0E-4AAC-94CC-347814F8E8FC}" type="slidenum">
+            <a:fld id="{2DFBAB14-4BC0-47B1-9BBA-923216C38DE4}" type="slidenum">
               <a:t>11</a:t>
             </a:fld>
           </a:p>
@@ -5210,7 +5210,7 @@
           <a:p>
             <a:r>
               <a:rPr lang="en-US"/>
-              <a:t>10. Oct. 2018</a:t>
+              <a:t>27.May 2022</a:t>
             </a:r>
           </a:p>
         </p:txBody>
@@ -5415,7 +5415,7 @@
         <p:txBody>
           <a:bodyPr/>
           <a:p>
-            <a:fld id="{944A2C7D-8D1A-49C6-BB9D-E53A732FE110}" type="slidenum">
+            <a:fld id="{151F7666-F091-4FB6-B044-D4357D939947}" type="slidenum">
               <a:t>12</a:t>
             </a:fld>
           </a:p>
@@ -5437,7 +5437,7 @@
           <a:p>
             <a:r>
               <a:rPr lang="en-US"/>
-              <a:t>10. Oct. 2018</a:t>
+              <a:t>27.May 2022</a:t>
             </a:r>
           </a:p>
         </p:txBody>
@@ -5786,7 +5786,7 @@
         <p:txBody>
           <a:bodyPr/>
           <a:p>
-            <a:fld id="{C57A484E-36E3-4DA3-8921-A157A27B0879}" type="slidenum">
+            <a:fld id="{9F1BB7D0-E6BB-4175-8BEB-5A68C94FB41D}" type="slidenum">
               <a:t>13</a:t>
             </a:fld>
           </a:p>
@@ -5808,7 +5808,7 @@
           <a:p>
             <a:r>
               <a:rPr lang="en-US"/>
-              <a:t>10. Oct. 2018</a:t>
+              <a:t>27.May 2022</a:t>
             </a:r>
           </a:p>
         </p:txBody>
@@ -6052,7 +6052,7 @@
         <p:txBody>
           <a:bodyPr/>
           <a:p>
-            <a:fld id="{A9FD49AD-222D-480B-B63C-25BC2FA142CC}" type="slidenum">
+            <a:fld id="{9859DD08-6B68-4DC7-B1EE-B7743D4332EB}" type="slidenum">
               <a:t>14</a:t>
             </a:fld>
           </a:p>
@@ -6074,7 +6074,7 @@
           <a:p>
             <a:r>
               <a:rPr lang="en-US"/>
-              <a:t>10. Oct. 2018</a:t>
+              <a:t>27.May 2022</a:t>
             </a:r>
           </a:p>
         </p:txBody>
@@ -6294,7 +6294,7 @@
         <p:txBody>
           <a:bodyPr/>
           <a:p>
-            <a:fld id="{E0A182F7-D85F-40A0-A352-31C320CBA15E}" type="slidenum">
+            <a:fld id="{DAE880E6-619E-4674-A585-6EFD048B1450}" type="slidenum">
               <a:t>15</a:t>
             </a:fld>
           </a:p>
@@ -6316,7 +6316,7 @@
           <a:p>
             <a:r>
               <a:rPr lang="en-US"/>
-              <a:t>10. Oct. 2018</a:t>
+              <a:t>27.May 2022</a:t>
             </a:r>
           </a:p>
         </p:txBody>
@@ -6491,7 +6491,7 @@
         <p:txBody>
           <a:bodyPr/>
           <a:p>
-            <a:fld id="{FE070BE1-D240-42BB-912D-B8B56A413E20}" type="slidenum">
+            <a:fld id="{EAA9A29E-B340-4664-B676-6DD28BE04EAB}" type="slidenum">
               <a:t>16</a:t>
             </a:fld>
           </a:p>
@@ -6513,7 +6513,7 @@
           <a:p>
             <a:r>
               <a:rPr lang="en-US"/>
-              <a:t>10. Oct. 2018</a:t>
+              <a:t>27.May 2022</a:t>
             </a:r>
           </a:p>
         </p:txBody>
@@ -6708,7 +6708,7 @@
         <p:txBody>
           <a:bodyPr/>
           <a:p>
-            <a:fld id="{3902891E-6541-4D36-AF9B-FDD3F1F46143}" type="slidenum">
+            <a:fld id="{7C8E3A61-AC4E-461B-9705-1A0ECE98DEE4}" type="slidenum">
               <a:t>17</a:t>
             </a:fld>
           </a:p>
@@ -6730,7 +6730,7 @@
           <a:p>
             <a:r>
               <a:rPr lang="en-US"/>
-              <a:t>10. Oct. 2018</a:t>
+              <a:t>27.May 2022</a:t>
             </a:r>
           </a:p>
         </p:txBody>
@@ -6905,7 +6905,7 @@
         <p:txBody>
           <a:bodyPr/>
           <a:p>
-            <a:fld id="{3E08CCB6-7CAB-4CCA-953C-F30B01A98792}" type="slidenum">
+            <a:fld id="{0870180E-0B3D-42F4-8A5E-94D9961889AC}" type="slidenum">
               <a:t>18</a:t>
             </a:fld>
           </a:p>
@@ -6927,7 +6927,7 @@
           <a:p>
             <a:r>
               <a:rPr lang="en-US"/>
-              <a:t>10. Oct. 2018</a:t>
+              <a:t>27.May 2022</a:t>
             </a:r>
           </a:p>
         </p:txBody>
@@ -7166,7 +7166,7 @@
         <p:txBody>
           <a:bodyPr/>
           <a:p>
-            <a:fld id="{A0097983-B19C-4EB5-A81A-224F2A3E593C}" type="slidenum">
+            <a:fld id="{46B270AC-E746-4D19-9088-FFFC1455AF92}" type="slidenum">
               <a:t>19</a:t>
             </a:fld>
           </a:p>
@@ -7188,7 +7188,7 @@
           <a:p>
             <a:r>
               <a:rPr lang="en-US"/>
-              <a:t>10. Oct. 2018</a:t>
+              <a:t>27.May 2022</a:t>
             </a:r>
           </a:p>
         </p:txBody>
@@ -7258,7 +7258,13 @@
               <a:rPr b="0" lang="en-US" sz="4400" spc="-1" strike="noStrike">
                 <a:latin typeface="Arial"/>
               </a:rPr>
-              <a:t>The “I” in IoT</a:t>
+              <a:t>The “I” in </a:t>
+            </a:r>
+            <a:r>
+              <a:rPr b="0" lang="en-US" sz="4400" spc="-1" strike="noStrike">
+                <a:latin typeface="Arial"/>
+              </a:rPr>
+              <a:t>IoT</a:t>
             </a:r>
             <a:endParaRPr b="0" lang="en-US" sz="4400" spc="-1" strike="noStrike">
               <a:latin typeface="Arial"/>
@@ -7440,7 +7446,7 @@
         <p:txBody>
           <a:bodyPr/>
           <a:p>
-            <a:fld id="{5D55516B-A83A-44B0-9466-B6D321BF8601}" type="slidenum">
+            <a:fld id="{D4D24650-CBE4-40FE-92EF-863599894763}" type="slidenum">
               <a:t>2</a:t>
             </a:fld>
           </a:p>
@@ -7462,7 +7468,7 @@
           <a:p>
             <a:r>
               <a:rPr lang="en-US"/>
-              <a:t>10. Oct. 2018</a:t>
+              <a:t>27.May 2022</a:t>
             </a:r>
           </a:p>
         </p:txBody>
@@ -7648,7 +7654,7 @@
         <p:txBody>
           <a:bodyPr/>
           <a:p>
-            <a:fld id="{321FE021-F167-48F9-A5B1-E4EAB844FEDC}" type="slidenum">
+            <a:fld id="{755BFB77-5362-4E67-9AA9-4BAA61A9D711}" type="slidenum">
               <a:t>20</a:t>
             </a:fld>
           </a:p>
@@ -7670,7 +7676,7 @@
           <a:p>
             <a:r>
               <a:rPr lang="en-US"/>
-              <a:t>10. Oct. 2018</a:t>
+              <a:t>27.May 2022</a:t>
             </a:r>
           </a:p>
         </p:txBody>
@@ -7841,7 +7847,7 @@
         <p:txBody>
           <a:bodyPr/>
           <a:p>
-            <a:fld id="{454C9716-09DB-47C4-A02F-71002B0715C1}" type="slidenum">
+            <a:fld id="{69852789-6A3B-4520-8523-FA6947E2E7F0}" type="slidenum">
               <a:t>21</a:t>
             </a:fld>
           </a:p>
@@ -7863,7 +7869,7 @@
           <a:p>
             <a:r>
               <a:rPr lang="en-US"/>
-              <a:t>10. Oct. 2018</a:t>
+              <a:t>27.May 2022</a:t>
             </a:r>
           </a:p>
         </p:txBody>
@@ -8146,7 +8152,7 @@
         <p:txBody>
           <a:bodyPr/>
           <a:p>
-            <a:fld id="{F65EB13B-DB10-4E4E-97C8-E8CF978C680E}" type="slidenum">
+            <a:fld id="{3F292394-A075-440A-8398-A6858BBD38AE}" type="slidenum">
               <a:t>22</a:t>
             </a:fld>
           </a:p>
@@ -8168,7 +8174,7 @@
           <a:p>
             <a:r>
               <a:rPr lang="en-US"/>
-              <a:t>10. Oct. 2018</a:t>
+              <a:t>27.May 2022</a:t>
             </a:r>
           </a:p>
         </p:txBody>
@@ -8373,7 +8379,7 @@
         <p:txBody>
           <a:bodyPr/>
           <a:p>
-            <a:fld id="{71BE4B35-901D-4BE5-A88F-3C92DCF14265}" type="slidenum">
+            <a:fld id="{B401C418-3A49-4991-ADFA-5C18AF71825F}" type="slidenum">
               <a:t>23</a:t>
             </a:fld>
           </a:p>
@@ -8395,7 +8401,7 @@
           <a:p>
             <a:r>
               <a:rPr lang="en-US"/>
-              <a:t>10. Oct. 2018</a:t>
+              <a:t>27.May 2022</a:t>
             </a:r>
           </a:p>
         </p:txBody>
@@ -8688,7 +8694,7 @@
         <p:txBody>
           <a:bodyPr/>
           <a:p>
-            <a:fld id="{DE661002-9E3C-4BAC-92D3-6A4EBC70E4A3}" type="slidenum">
+            <a:fld id="{33498BA5-300C-4277-BCBB-69F815D71857}" type="slidenum">
               <a:t>24</a:t>
             </a:fld>
           </a:p>
@@ -8710,7 +8716,7 @@
           <a:p>
             <a:r>
               <a:rPr lang="en-US"/>
-              <a:t>10. Oct. 2018</a:t>
+              <a:t>27.May 2022</a:t>
             </a:r>
           </a:p>
         </p:txBody>
@@ -8951,7 +8957,7 @@
         <p:txBody>
           <a:bodyPr/>
           <a:p>
-            <a:fld id="{0F4B39D9-A28C-470B-937D-E5507D689D2A}" type="slidenum">
+            <a:fld id="{D8F962FF-512F-4234-B5F5-7F57B878E9A8}" type="slidenum">
               <a:t>25</a:t>
             </a:fld>
           </a:p>
@@ -8973,7 +8979,7 @@
           <a:p>
             <a:r>
               <a:rPr lang="en-US"/>
-              <a:t>10. Oct. 2018</a:t>
+              <a:t>27.May 2022</a:t>
             </a:r>
           </a:p>
         </p:txBody>
@@ -9142,7 +9148,7 @@
         <p:txBody>
           <a:bodyPr/>
           <a:p>
-            <a:fld id="{3AAC5DDF-16F0-420D-AA64-CC358DE4E81B}" type="slidenum">
+            <a:fld id="{C8CD474A-7194-410B-89DD-75BA31BC43BA}" type="slidenum">
               <a:t>26</a:t>
             </a:fld>
           </a:p>
@@ -9164,7 +9170,7 @@
           <a:p>
             <a:r>
               <a:rPr lang="en-US"/>
-              <a:t>10. Oct. 2018</a:t>
+              <a:t>27.May 2022</a:t>
             </a:r>
           </a:p>
         </p:txBody>
@@ -9333,7 +9339,7 @@
         <p:txBody>
           <a:bodyPr/>
           <a:p>
-            <a:fld id="{AEFD5FD3-7F38-48C9-8D8B-D8E9A407E49E}" type="slidenum">
+            <a:fld id="{66ADA2E8-7CF6-4B5E-AFF5-0742720AC4A7}" type="slidenum">
               <a:t>27</a:t>
             </a:fld>
           </a:p>
@@ -9355,7 +9361,7 @@
           <a:p>
             <a:r>
               <a:rPr lang="en-US"/>
-              <a:t>10. Oct. 2018</a:t>
+              <a:t>27.May 2022</a:t>
             </a:r>
           </a:p>
         </p:txBody>
@@ -9524,7 +9530,7 @@
         <p:txBody>
           <a:bodyPr/>
           <a:p>
-            <a:fld id="{ED7210CB-30BC-4C9F-84D4-CE0452208797}" type="slidenum">
+            <a:fld id="{369FB464-01F7-4400-9AD7-9A706FE29D9E}" type="slidenum">
               <a:t>28</a:t>
             </a:fld>
           </a:p>
@@ -9546,7 +9552,7 @@
           <a:p>
             <a:r>
               <a:rPr lang="en-US"/>
-              <a:t>10. Oct. 2018</a:t>
+              <a:t>27.May 2022</a:t>
             </a:r>
           </a:p>
         </p:txBody>
@@ -9841,7 +9847,7 @@
         <p:txBody>
           <a:bodyPr/>
           <a:p>
-            <a:fld id="{918A9C3D-9F40-443C-A5F9-BC789DCDB4D1}" type="slidenum">
+            <a:fld id="{01B293D9-408D-42A2-A74E-8619E7AAF426}" type="slidenum">
               <a:t>29</a:t>
             </a:fld>
           </a:p>
@@ -9863,7 +9869,7 @@
           <a:p>
             <a:r>
               <a:rPr lang="en-US"/>
-              <a:t>10. Oct. 2018</a:t>
+              <a:t>27.May 2022</a:t>
             </a:r>
           </a:p>
         </p:txBody>
@@ -10173,7 +10179,7 @@
         <p:txBody>
           <a:bodyPr/>
           <a:p>
-            <a:fld id="{B3BD1843-1BD0-4616-AAAD-CDA1AA33FE98}" type="slidenum">
+            <a:fld id="{7AD34CBF-2B3E-4DB8-A869-0B25B9782C5E}" type="slidenum">
               <a:t>3</a:t>
             </a:fld>
           </a:p>
@@ -10195,7 +10201,7 @@
           <a:p>
             <a:r>
               <a:rPr lang="en-US"/>
-              <a:t>10. Oct. 2018</a:t>
+              <a:t>27.May 2022</a:t>
             </a:r>
           </a:p>
         </p:txBody>
@@ -10368,7 +10374,7 @@
           <a:bodyPr/>
           <a:p>
             <a:r>
-              <a:t>IoT lectures, African Internet Summit Mauritius 2022</a:t>
+              <a:t>IoT course, African Internet Summit, Mauritius 2022</a:t>
             </a:r>
           </a:p>
         </p:txBody>
@@ -10387,7 +10393,7 @@
         <p:txBody>
           <a:bodyPr/>
           <a:p>
-            <a:fld id="{0BC44A1C-4766-43C6-A917-3BD5AAE9AB68}" type="slidenum">
+            <a:fld id="{D087E5D2-FE9E-4248-A5B7-36ACE5C8B203}" type="slidenum">
               <a:t>30</a:t>
             </a:fld>
           </a:p>
@@ -10407,10 +10413,10 @@
         <p:txBody>
           <a:bodyPr/>
           <a:p>
-            <a:fld id="{492DCFAE-7D84-4F59-B4B9-BC23FB26BB5E}" type="datetime1">
+            <a:r>
               <a:rPr lang="en-US"/>
-              <a:t>05/26/22</a:t>
-            </a:fld>
+              <a:t>27.May 2022</a:t>
+            </a:r>
           </a:p>
         </p:txBody>
       </p:sp>
@@ -10648,7 +10654,7 @@
           <a:bodyPr/>
           <a:p>
             <a:r>
-              <a:t>IoT lectures, African Internet Summit Mauritius 2022</a:t>
+              <a:t>IoT course, African Internet Summit, Mauritius 2022</a:t>
             </a:r>
           </a:p>
         </p:txBody>
@@ -10667,7 +10673,7 @@
         <p:txBody>
           <a:bodyPr/>
           <a:p>
-            <a:fld id="{508A6312-394C-4F7C-B52D-C77DF65817BD}" type="slidenum">
+            <a:fld id="{6AC20EA1-D499-43CD-9E69-E285A93888CF}" type="slidenum">
               <a:t>31</a:t>
             </a:fld>
           </a:p>
@@ -10687,10 +10693,10 @@
         <p:txBody>
           <a:bodyPr/>
           <a:p>
-            <a:fld id="{4A80DBA0-1ABB-42C6-BAB7-A68FB9AA8CE6}" type="datetime1">
+            <a:r>
               <a:rPr lang="en-US"/>
-              <a:t>05/26/22</a:t>
-            </a:fld>
+              <a:t>27.May 2022</a:t>
+            </a:r>
           </a:p>
         </p:txBody>
       </p:sp>
@@ -10998,7 +11004,7 @@
         <p:txBody>
           <a:bodyPr/>
           <a:p>
-            <a:fld id="{7634E0EE-5550-45D0-BF1E-EFEF4819D1B9}" type="slidenum">
+            <a:fld id="{8764E063-B9A1-45B1-9F5E-46269F4ED4CF}" type="slidenum">
               <a:t>32</a:t>
             </a:fld>
           </a:p>
@@ -11020,7 +11026,7 @@
           <a:p>
             <a:r>
               <a:rPr lang="en-US"/>
-              <a:t>10. Oct. 2018</a:t>
+              <a:t>27.May 2022</a:t>
             </a:r>
           </a:p>
         </p:txBody>
@@ -11299,7 +11305,7 @@
         <p:txBody>
           <a:bodyPr/>
           <a:p>
-            <a:fld id="{BE95E3C1-4541-4DDE-8E42-B4E0D716319D}" type="slidenum">
+            <a:fld id="{16018FAD-6910-4D5E-B439-528676241A39}" type="slidenum">
               <a:t>33</a:t>
             </a:fld>
           </a:p>
@@ -11321,7 +11327,7 @@
           <a:p>
             <a:r>
               <a:rPr lang="en-US"/>
-              <a:t>10. Oct. 2018</a:t>
+              <a:t>27.May 2022</a:t>
             </a:r>
           </a:p>
         </p:txBody>
@@ -11530,7 +11536,7 @@
         <p:txBody>
           <a:bodyPr/>
           <a:p>
-            <a:fld id="{5230BA8A-60FC-475E-AE31-EC2738575EB4}" type="slidenum">
+            <a:fld id="{BC3DF02E-8EA1-42F7-98D0-0BB3AAE49BD8}" type="slidenum">
               <a:t>34</a:t>
             </a:fld>
           </a:p>
@@ -11552,7 +11558,7 @@
           <a:p>
             <a:r>
               <a:rPr lang="en-US"/>
-              <a:t>10. Oct. 2018</a:t>
+              <a:t>27.May 2022</a:t>
             </a:r>
           </a:p>
         </p:txBody>
@@ -11798,7 +11804,7 @@
         <p:txBody>
           <a:bodyPr/>
           <a:p>
-            <a:fld id="{A0F5C89E-56D2-466D-A1AC-535096FE21E8}" type="slidenum">
+            <a:fld id="{B90FDCDD-4E74-4D02-8840-C86EF3887E61}" type="slidenum">
               <a:t>35</a:t>
             </a:fld>
           </a:p>
@@ -11820,7 +11826,7 @@
           <a:p>
             <a:r>
               <a:rPr lang="en-US"/>
-              <a:t>10. Oct. 2018</a:t>
+              <a:t>27.May 2022</a:t>
             </a:r>
           </a:p>
         </p:txBody>
@@ -12005,7 +12011,7 @@
         <p:txBody>
           <a:bodyPr/>
           <a:p>
-            <a:fld id="{18B67804-DC52-4ECD-9D84-A624B48C7988}" type="slidenum">
+            <a:fld id="{DDD47F75-E295-4BF0-A665-6FE69CADFD8D}" type="slidenum">
               <a:t>36</a:t>
             </a:fld>
           </a:p>
@@ -12027,7 +12033,7 @@
           <a:p>
             <a:r>
               <a:rPr lang="en-US"/>
-              <a:t>10. Oct. 2018</a:t>
+              <a:t>27.May 2022</a:t>
             </a:r>
           </a:p>
         </p:txBody>
@@ -12351,7 +12357,7 @@
         <p:txBody>
           <a:bodyPr/>
           <a:p>
-            <a:fld id="{051710F3-668B-4897-9666-506E1DD83CB0}" type="slidenum">
+            <a:fld id="{EFA25047-37D3-493E-A502-14FB6FAF541A}" type="slidenum">
               <a:t>37</a:t>
             </a:fld>
           </a:p>
@@ -12373,7 +12379,7 @@
           <a:p>
             <a:r>
               <a:rPr lang="en-US"/>
-              <a:t>10. Oct. 2018</a:t>
+              <a:t>27.May 2022</a:t>
             </a:r>
           </a:p>
         </p:txBody>
@@ -12536,7 +12542,7 @@
         <p:txBody>
           <a:bodyPr/>
           <a:p>
-            <a:fld id="{C2BCD992-EBD0-4DC6-BB51-F0CCFE8D2489}" type="slidenum">
+            <a:fld id="{D253BC36-7353-46A1-87CF-4B3255FF7012}" type="slidenum">
               <a:t>38</a:t>
             </a:fld>
           </a:p>
@@ -12558,7 +12564,7 @@
           <a:p>
             <a:r>
               <a:rPr lang="en-US"/>
-              <a:t>10. Oct. 2018</a:t>
+              <a:t>27.May 2022</a:t>
             </a:r>
           </a:p>
         </p:txBody>
@@ -12851,7 +12857,7 @@
         <p:txBody>
           <a:bodyPr/>
           <a:p>
-            <a:fld id="{E3BCF235-B08D-4927-82EE-7409AAF6C4A1}" type="slidenum">
+            <a:fld id="{9F5334E5-0643-49A7-99C6-2B3C73D3C20F}" type="slidenum">
               <a:t>4</a:t>
             </a:fld>
           </a:p>
@@ -12873,7 +12879,7 @@
           <a:p>
             <a:r>
               <a:rPr lang="en-US"/>
-              <a:t>10. Oct. 2018</a:t>
+              <a:t>27.May 2022</a:t>
             </a:r>
           </a:p>
         </p:txBody>
@@ -13179,7 +13185,7 @@
         <p:txBody>
           <a:bodyPr/>
           <a:p>
-            <a:fld id="{ECB633C5-1E5C-458F-878B-A71F4C03E56E}" type="slidenum">
+            <a:fld id="{EEAD243A-12CC-457C-A437-C759F6E8DAC2}" type="slidenum">
               <a:t>5</a:t>
             </a:fld>
           </a:p>
@@ -13201,7 +13207,7 @@
           <a:p>
             <a:r>
               <a:rPr lang="en-US"/>
-              <a:t>10. Oct. 2018</a:t>
+              <a:t>27.May 2022</a:t>
             </a:r>
           </a:p>
         </p:txBody>
@@ -13488,7 +13494,7 @@
         <p:txBody>
           <a:bodyPr/>
           <a:p>
-            <a:fld id="{8E8A3FBC-8482-4E93-8496-13F27218DD0F}" type="slidenum">
+            <a:fld id="{0731AF1E-4E3A-4285-8150-E99709E8CC3F}" type="slidenum">
               <a:t>6</a:t>
             </a:fld>
           </a:p>
@@ -13510,7 +13516,7 @@
           <a:p>
             <a:r>
               <a:rPr lang="en-US"/>
-              <a:t>10. Oct. 2018</a:t>
+              <a:t>27.May 2022</a:t>
             </a:r>
           </a:p>
         </p:txBody>
@@ -13747,7 +13753,7 @@
         <p:txBody>
           <a:bodyPr/>
           <a:p>
-            <a:fld id="{2596CF3E-59CD-4070-99F3-5325D7C68829}" type="slidenum">
+            <a:fld id="{C7F3EF9D-A492-41EE-9CD9-B5CB9123F227}" type="slidenum">
               <a:t>7</a:t>
             </a:fld>
           </a:p>
@@ -13769,7 +13775,7 @@
           <a:p>
             <a:r>
               <a:rPr lang="en-US"/>
-              <a:t>10. Oct. 2018</a:t>
+              <a:t>27.May 2022</a:t>
             </a:r>
           </a:p>
         </p:txBody>
@@ -14002,7 +14008,7 @@
         <p:txBody>
           <a:bodyPr/>
           <a:p>
-            <a:fld id="{5767F56A-FA1B-4EA2-978E-977817FE254E}" type="slidenum">
+            <a:fld id="{8E33CC5E-E7DD-4E19-8469-765FC61CB384}" type="slidenum">
               <a:t>8</a:t>
             </a:fld>
           </a:p>
@@ -14024,7 +14030,7 @@
           <a:p>
             <a:r>
               <a:rPr lang="en-US"/>
-              <a:t>10. Oct. 2018</a:t>
+              <a:t>27.May 2022</a:t>
             </a:r>
           </a:p>
         </p:txBody>
@@ -14199,7 +14205,7 @@
         <p:txBody>
           <a:bodyPr/>
           <a:p>
-            <a:fld id="{12B0C832-70EF-4037-97C7-61989A90ED78}" type="slidenum">
+            <a:fld id="{22784A1D-F59D-4C43-84EA-839D7A282BD6}" type="slidenum">
               <a:t>9</a:t>
             </a:fld>
           </a:p>
@@ -14221,7 +14227,7 @@
           <a:p>
             <a:r>
               <a:rPr lang="en-US"/>
-              <a:t>10. Oct. 2018</a:t>
+              <a:t>27.May 2022</a:t>
             </a:r>
           </a:p>
         </p:txBody>

</xml_diff>